<commit_message>
improved code and Presentation and corrected title in readme
</commit_message>
<xml_diff>
--- a/Project1.pptx
+++ b/Project1.pptx
@@ -263,7 +263,7 @@
           <a:p>
             <a:fld id="{4B945195-BE4E-9642-ABB8-553B82F17F0E}" type="datetimeFigureOut">
               <a:rPr lang="en-US" smtClean="0"/>
-              <a:t>5/3/21</a:t>
+              <a:t>5/4/2021</a:t>
             </a:fld>
             <a:endParaRPr lang="en-US"/>
           </a:p>
@@ -1499,7 +1499,7 @@
           <a:p>
             <a:fld id="{DFC83F58-CC68-4834-9D88-EB3F7809F924}" type="datetimeFigureOut">
               <a:rPr lang="en-AU" smtClean="0"/>
-              <a:t>3/5/21</a:t>
+              <a:t>4/05/2021</a:t>
             </a:fld>
             <a:endParaRPr lang="en-AU"/>
           </a:p>
@@ -1699,7 +1699,7 @@
           <a:p>
             <a:fld id="{DFC83F58-CC68-4834-9D88-EB3F7809F924}" type="datetimeFigureOut">
               <a:rPr lang="en-AU" smtClean="0"/>
-              <a:t>3/5/21</a:t>
+              <a:t>4/05/2021</a:t>
             </a:fld>
             <a:endParaRPr lang="en-AU"/>
           </a:p>
@@ -1909,7 +1909,7 @@
           <a:p>
             <a:fld id="{DFC83F58-CC68-4834-9D88-EB3F7809F924}" type="datetimeFigureOut">
               <a:rPr lang="en-AU" smtClean="0"/>
-              <a:t>3/5/21</a:t>
+              <a:t>4/05/2021</a:t>
             </a:fld>
             <a:endParaRPr lang="en-AU"/>
           </a:p>
@@ -2220,7 +2220,7 @@
           <a:p>
             <a:fld id="{ED291B17-9318-49DB-B28B-6E5994AE9581}" type="datetime1">
               <a:rPr lang="en-US" smtClean="0"/>
-              <a:t>5/3/21</a:t>
+              <a:t>5/4/2021</a:t>
             </a:fld>
             <a:endParaRPr lang="en-US" dirty="0"/>
           </a:p>
@@ -2418,7 +2418,7 @@
           <a:p>
             <a:fld id="{78DD82B9-B8EE-4375-B6FF-88FA6ABB15D9}" type="datetime1">
               <a:rPr lang="en-US" smtClean="0"/>
-              <a:t>5/3/21</a:t>
+              <a:t>5/4/2021</a:t>
             </a:fld>
             <a:endParaRPr lang="en-US" dirty="0"/>
           </a:p>
@@ -2730,7 +2730,7 @@
           <a:p>
             <a:fld id="{B2497495-0637-405E-AE64-5CC7506D51F5}" type="datetime1">
               <a:rPr lang="en-US" smtClean="0"/>
-              <a:t>5/3/21</a:t>
+              <a:t>5/4/2021</a:t>
             </a:fld>
             <a:endParaRPr lang="en-US" dirty="0"/>
           </a:p>
@@ -2983,7 +2983,7 @@
           <a:p>
             <a:fld id="{7BFFD690-9426-415D-8B65-26881E07B2D4}" type="datetime1">
               <a:rPr lang="en-US" smtClean="0"/>
-              <a:t>5/3/21</a:t>
+              <a:t>5/4/2021</a:t>
             </a:fld>
             <a:endParaRPr lang="en-US" dirty="0"/>
           </a:p>
@@ -3405,7 +3405,7 @@
           <a:p>
             <a:fld id="{04C4989A-474C-40DE-95B9-011C28B71673}" type="datetime1">
               <a:rPr lang="en-US" smtClean="0"/>
-              <a:t>5/3/21</a:t>
+              <a:t>5/4/2021</a:t>
             </a:fld>
             <a:endParaRPr lang="en-US" dirty="0"/>
           </a:p>
@@ -3528,7 +3528,7 @@
           <a:p>
             <a:fld id="{5DB4ED54-5B5E-4A04-93D3-5772E3CE3818}" type="datetime1">
               <a:rPr lang="en-US" smtClean="0"/>
-              <a:t>5/3/21</a:t>
+              <a:t>5/4/2021</a:t>
             </a:fld>
             <a:endParaRPr lang="en-US" dirty="0"/>
           </a:p>
@@ -3623,7 +3623,7 @@
           <a:p>
             <a:fld id="{4EDE50D6-574B-40AF-946F-D52A04ADE379}" type="datetime1">
               <a:rPr lang="en-US" smtClean="0"/>
-              <a:t>5/3/21</a:t>
+              <a:t>5/4/2021</a:t>
             </a:fld>
             <a:endParaRPr lang="en-US" dirty="0"/>
           </a:p>
@@ -4000,7 +4000,7 @@
           <a:p>
             <a:fld id="{D82884F1-FFEA-405F-9602-3DCA865EDA4E}" type="datetime1">
               <a:rPr lang="en-US" smtClean="0"/>
-              <a:t>5/3/21</a:t>
+              <a:t>5/4/2021</a:t>
             </a:fld>
             <a:endParaRPr lang="en-US" dirty="0"/>
           </a:p>
@@ -4211,7 +4211,7 @@
           <a:p>
             <a:fld id="{DFC83F58-CC68-4834-9D88-EB3F7809F924}" type="datetimeFigureOut">
               <a:rPr lang="en-AU" smtClean="0"/>
-              <a:t>3/5/21</a:t>
+              <a:t>4/05/2021</a:t>
             </a:fld>
             <a:endParaRPr lang="en-AU"/>
           </a:p>
@@ -4493,7 +4493,7 @@
           <a:p>
             <a:fld id="{7E18DB4A-8810-4A10-AD5C-D5E2C667F5B3}" type="datetime1">
               <a:rPr lang="en-US" smtClean="0"/>
-              <a:t>5/3/21</a:t>
+              <a:t>5/4/2021</a:t>
             </a:fld>
             <a:endParaRPr lang="en-US" dirty="0"/>
           </a:p>
@@ -4685,7 +4685,7 @@
           <a:p>
             <a:fld id="{2CED4963-E985-44C4-B8C4-FDD613B7C2F8}" type="datetime1">
               <a:rPr lang="en-US" smtClean="0"/>
-              <a:t>5/3/21</a:t>
+              <a:t>5/4/2021</a:t>
             </a:fld>
             <a:endParaRPr lang="en-US" dirty="0"/>
           </a:p>
@@ -5047,7 +5047,7 @@
           <a:p>
             <a:fld id="{ED291B17-9318-49DB-B28B-6E5994AE9581}" type="datetime1">
               <a:rPr lang="en-US" smtClean="0"/>
-              <a:t>5/3/21</a:t>
+              <a:t>5/4/2021</a:t>
             </a:fld>
             <a:endParaRPr lang="en-US" dirty="0"/>
           </a:p>
@@ -5323,7 +5323,7 @@
           <a:p>
             <a:fld id="{DFC83F58-CC68-4834-9D88-EB3F7809F924}" type="datetimeFigureOut">
               <a:rPr lang="en-AU" smtClean="0"/>
-              <a:t>3/5/21</a:t>
+              <a:t>4/05/2021</a:t>
             </a:fld>
             <a:endParaRPr lang="en-AU"/>
           </a:p>
@@ -5591,7 +5591,7 @@
           <a:p>
             <a:fld id="{DFC83F58-CC68-4834-9D88-EB3F7809F924}" type="datetimeFigureOut">
               <a:rPr lang="en-AU" smtClean="0"/>
-              <a:t>3/5/21</a:t>
+              <a:t>4/05/2021</a:t>
             </a:fld>
             <a:endParaRPr lang="en-AU"/>
           </a:p>
@@ -6006,7 +6006,7 @@
           <a:p>
             <a:fld id="{DFC83F58-CC68-4834-9D88-EB3F7809F924}" type="datetimeFigureOut">
               <a:rPr lang="en-AU" smtClean="0"/>
-              <a:t>3/5/21</a:t>
+              <a:t>4/05/2021</a:t>
             </a:fld>
             <a:endParaRPr lang="en-AU"/>
           </a:p>
@@ -6148,7 +6148,7 @@
           <a:p>
             <a:fld id="{DFC83F58-CC68-4834-9D88-EB3F7809F924}" type="datetimeFigureOut">
               <a:rPr lang="en-AU" smtClean="0"/>
-              <a:t>3/5/21</a:t>
+              <a:t>4/05/2021</a:t>
             </a:fld>
             <a:endParaRPr lang="en-AU"/>
           </a:p>
@@ -6261,7 +6261,7 @@
           <a:p>
             <a:fld id="{DFC83F58-CC68-4834-9D88-EB3F7809F924}" type="datetimeFigureOut">
               <a:rPr lang="en-AU" smtClean="0"/>
-              <a:t>3/5/21</a:t>
+              <a:t>4/05/2021</a:t>
             </a:fld>
             <a:endParaRPr lang="en-AU"/>
           </a:p>
@@ -6574,7 +6574,7 @@
           <a:p>
             <a:fld id="{DFC83F58-CC68-4834-9D88-EB3F7809F924}" type="datetimeFigureOut">
               <a:rPr lang="en-AU" smtClean="0"/>
-              <a:t>3/5/21</a:t>
+              <a:t>4/05/2021</a:t>
             </a:fld>
             <a:endParaRPr lang="en-AU"/>
           </a:p>
@@ -6863,7 +6863,7 @@
           <a:p>
             <a:fld id="{DFC83F58-CC68-4834-9D88-EB3F7809F924}" type="datetimeFigureOut">
               <a:rPr lang="en-AU" smtClean="0"/>
-              <a:t>3/5/21</a:t>
+              <a:t>4/05/2021</a:t>
             </a:fld>
             <a:endParaRPr lang="en-AU"/>
           </a:p>
@@ -7106,7 +7106,7 @@
           <a:p>
             <a:fld id="{DFC83F58-CC68-4834-9D88-EB3F7809F924}" type="datetimeFigureOut">
               <a:rPr lang="en-AU" smtClean="0"/>
-              <a:t>3/5/21</a:t>
+              <a:t>4/05/2021</a:t>
             </a:fld>
             <a:endParaRPr lang="en-AU"/>
           </a:p>
@@ -7659,7 +7659,7 @@
           <a:p>
             <a:fld id="{ED291B17-9318-49DB-B28B-6E5994AE9581}" type="datetime1">
               <a:rPr lang="en-US" smtClean="0"/>
-              <a:t>5/3/21</a:t>
+              <a:t>5/4/2021</a:t>
             </a:fld>
             <a:endParaRPr lang="en-US" dirty="0"/>
           </a:p>
@@ -8954,8 +8954,8 @@
         </p:nvSpPr>
         <p:spPr>
           <a:xfrm>
-            <a:off x="4773152" y="631961"/>
-            <a:ext cx="6650991" cy="4658216"/>
+            <a:off x="4422988" y="933450"/>
+            <a:ext cx="6872464" cy="5377203"/>
           </a:xfrm>
         </p:spPr>
         <p:txBody>
@@ -8964,8 +8964,11 @@
           <a:p>
             <a:r>
               <a:rPr lang="en-AU" sz="1400" dirty="0"/>
-              <a:t>Data was mostly cleaned so we filtered to required date range </a:t>
-            </a:r>
+              <a:t>Data was mostly cleaned so we filtered to required date range and remove NA values</a:t>
+            </a:r>
+          </a:p>
+          <a:p>
+            <a:endParaRPr lang="en-AU" sz="1400" dirty="0"/>
           </a:p>
           <a:p>
             <a:endParaRPr lang="en-AU" dirty="0"/>
@@ -8997,6 +9000,15 @@
           <a:p>
             <a:endParaRPr lang="en-AU" dirty="0"/>
           </a:p>
+          <a:p>
+            <a:endParaRPr lang="en-AU" dirty="0"/>
+          </a:p>
+          <a:p>
+            <a:endParaRPr lang="en-AU" dirty="0"/>
+          </a:p>
+          <a:p>
+            <a:endParaRPr lang="en-AU" dirty="0"/>
+          </a:p>
         </p:txBody>
       </p:sp>
       <p:sp>
@@ -9029,10 +9041,10 @@
       </p:sp>
       <p:pic>
         <p:nvPicPr>
-          <p:cNvPr id="6" name="Picture 5">
-            <a:extLst>
-              <a:ext uri="{FF2B5EF4-FFF2-40B4-BE49-F238E27FC236}">
-                <a16:creationId xmlns:a16="http://schemas.microsoft.com/office/drawing/2014/main" id="{176C2D3A-FF05-4479-8921-48AA2E76A3AC}"/>
+          <p:cNvPr id="8" name="Picture 7">
+            <a:extLst>
+              <a:ext uri="{FF2B5EF4-FFF2-40B4-BE49-F238E27FC236}">
+                <a16:creationId xmlns:a16="http://schemas.microsoft.com/office/drawing/2014/main" id="{0790FAE4-6EAB-4CD2-A65D-8EA798253978}"/>
               </a:ext>
             </a:extLst>
           </p:cNvPr>
@@ -9049,8 +9061,8 @@
         </p:blipFill>
         <p:spPr>
           <a:xfrm>
-            <a:off x="5128506" y="1136837"/>
-            <a:ext cx="2415333" cy="1443217"/>
+            <a:off x="4911291" y="2958234"/>
+            <a:ext cx="5126789" cy="441325"/>
           </a:xfrm>
           <a:prstGeom prst="rect">
             <a:avLst/>
@@ -9059,10 +9071,10 @@
       </p:pic>
       <p:pic>
         <p:nvPicPr>
-          <p:cNvPr id="8" name="Picture 7">
-            <a:extLst>
-              <a:ext uri="{FF2B5EF4-FFF2-40B4-BE49-F238E27FC236}">
-                <a16:creationId xmlns:a16="http://schemas.microsoft.com/office/drawing/2014/main" id="{0790FAE4-6EAB-4CD2-A65D-8EA798253978}"/>
+          <p:cNvPr id="10" name="Picture 9">
+            <a:extLst>
+              <a:ext uri="{FF2B5EF4-FFF2-40B4-BE49-F238E27FC236}">
+                <a16:creationId xmlns:a16="http://schemas.microsoft.com/office/drawing/2014/main" id="{AAAA1234-CABE-45CF-8FA3-48F5091BB311}"/>
               </a:ext>
             </a:extLst>
           </p:cNvPr>
@@ -9079,8 +9091,8 @@
         </p:blipFill>
         <p:spPr>
           <a:xfrm>
-            <a:off x="4911291" y="2866977"/>
-            <a:ext cx="5434742" cy="403838"/>
+            <a:off x="4931611" y="3364290"/>
+            <a:ext cx="4277780" cy="403855"/>
           </a:xfrm>
           <a:prstGeom prst="rect">
             <a:avLst/>
@@ -9089,10 +9101,10 @@
       </p:pic>
       <p:pic>
         <p:nvPicPr>
-          <p:cNvPr id="10" name="Picture 9">
-            <a:extLst>
-              <a:ext uri="{FF2B5EF4-FFF2-40B4-BE49-F238E27FC236}">
-                <a16:creationId xmlns:a16="http://schemas.microsoft.com/office/drawing/2014/main" id="{AAAA1234-CABE-45CF-8FA3-48F5091BB311}"/>
+          <p:cNvPr id="12" name="Picture 11">
+            <a:extLst>
+              <a:ext uri="{FF2B5EF4-FFF2-40B4-BE49-F238E27FC236}">
+                <a16:creationId xmlns:a16="http://schemas.microsoft.com/office/drawing/2014/main" id="{AB2BCBA8-39EC-4DDA-A72C-7D210102A1A7}"/>
               </a:ext>
             </a:extLst>
           </p:cNvPr>
@@ -9109,8 +9121,8 @@
         </p:blipFill>
         <p:spPr>
           <a:xfrm>
-            <a:off x="4942912" y="3273592"/>
-            <a:ext cx="4277780" cy="441325"/>
+            <a:off x="4931611" y="3748846"/>
+            <a:ext cx="3955002" cy="357509"/>
           </a:xfrm>
           <a:prstGeom prst="rect">
             <a:avLst/>
@@ -9119,10 +9131,10 @@
       </p:pic>
       <p:pic>
         <p:nvPicPr>
-          <p:cNvPr id="12" name="Picture 11">
-            <a:extLst>
-              <a:ext uri="{FF2B5EF4-FFF2-40B4-BE49-F238E27FC236}">
-                <a16:creationId xmlns:a16="http://schemas.microsoft.com/office/drawing/2014/main" id="{AB2BCBA8-39EC-4DDA-A72C-7D210102A1A7}"/>
+          <p:cNvPr id="14" name="Picture 13">
+            <a:extLst>
+              <a:ext uri="{FF2B5EF4-FFF2-40B4-BE49-F238E27FC236}">
+                <a16:creationId xmlns:a16="http://schemas.microsoft.com/office/drawing/2014/main" id="{80A9D1C9-0184-4AE7-A250-25D99D0883AA}"/>
               </a:ext>
             </a:extLst>
           </p:cNvPr>
@@ -9139,8 +9151,8 @@
         </p:blipFill>
         <p:spPr>
           <a:xfrm>
-            <a:off x="4911291" y="3716593"/>
-            <a:ext cx="4047065" cy="413256"/>
+            <a:off x="4911291" y="4075727"/>
+            <a:ext cx="4590518" cy="557804"/>
           </a:xfrm>
           <a:prstGeom prst="rect">
             <a:avLst/>
@@ -9149,10 +9161,10 @@
       </p:pic>
       <p:pic>
         <p:nvPicPr>
-          <p:cNvPr id="14" name="Picture 13">
-            <a:extLst>
-              <a:ext uri="{FF2B5EF4-FFF2-40B4-BE49-F238E27FC236}">
-                <a16:creationId xmlns:a16="http://schemas.microsoft.com/office/drawing/2014/main" id="{80A9D1C9-0184-4AE7-A250-25D99D0883AA}"/>
+          <p:cNvPr id="16" name="Picture 15">
+            <a:extLst>
+              <a:ext uri="{FF2B5EF4-FFF2-40B4-BE49-F238E27FC236}">
+                <a16:creationId xmlns:a16="http://schemas.microsoft.com/office/drawing/2014/main" id="{4DCA2303-ED2B-4C2E-BDA6-BC372E8294FE}"/>
               </a:ext>
             </a:extLst>
           </p:cNvPr>
@@ -9169,8 +9181,8 @@
         </p:blipFill>
         <p:spPr>
           <a:xfrm>
-            <a:off x="4911291" y="4129849"/>
-            <a:ext cx="4590518" cy="557804"/>
+            <a:off x="4913867" y="4657891"/>
+            <a:ext cx="6530693" cy="1925789"/>
           </a:xfrm>
           <a:prstGeom prst="rect">
             <a:avLst/>
@@ -9179,10 +9191,10 @@
       </p:pic>
       <p:pic>
         <p:nvPicPr>
-          <p:cNvPr id="16" name="Picture 15">
-            <a:extLst>
-              <a:ext uri="{FF2B5EF4-FFF2-40B4-BE49-F238E27FC236}">
-                <a16:creationId xmlns:a16="http://schemas.microsoft.com/office/drawing/2014/main" id="{4DCA2303-ED2B-4C2E-BDA6-BC372E8294FE}"/>
+          <p:cNvPr id="11" name="Picture 10">
+            <a:extLst>
+              <a:ext uri="{FF2B5EF4-FFF2-40B4-BE49-F238E27FC236}">
+                <a16:creationId xmlns:a16="http://schemas.microsoft.com/office/drawing/2014/main" id="{5900A792-7674-4CDB-AE35-B8458ED39DE4}"/>
               </a:ext>
             </a:extLst>
           </p:cNvPr>
@@ -9199,8 +9211,38 @@
         </p:blipFill>
         <p:spPr>
           <a:xfrm>
-            <a:off x="4913867" y="4657891"/>
-            <a:ext cx="6530693" cy="1925789"/>
+            <a:off x="8612601" y="1005333"/>
+            <a:ext cx="2150226" cy="1760656"/>
+          </a:xfrm>
+          <a:prstGeom prst="rect">
+            <a:avLst/>
+          </a:prstGeom>
+        </p:spPr>
+      </p:pic>
+      <p:pic>
+        <p:nvPicPr>
+          <p:cNvPr id="15" name="Picture 14">
+            <a:extLst>
+              <a:ext uri="{FF2B5EF4-FFF2-40B4-BE49-F238E27FC236}">
+                <a16:creationId xmlns:a16="http://schemas.microsoft.com/office/drawing/2014/main" id="{492A5F8B-AAEF-4086-84ED-EAA57976A435}"/>
+              </a:ext>
+            </a:extLst>
+          </p:cNvPr>
+          <p:cNvPicPr>
+            <a:picLocks noChangeAspect="1"/>
+          </p:cNvPicPr>
+          <p:nvPr/>
+        </p:nvPicPr>
+        <p:blipFill>
+          <a:blip r:embed="rId8"/>
+          <a:stretch>
+            <a:fillRect/>
+          </a:stretch>
+        </p:blipFill>
+        <p:spPr>
+          <a:xfrm>
+            <a:off x="4931611" y="1058252"/>
+            <a:ext cx="3460917" cy="441325"/>
           </a:xfrm>
           <a:prstGeom prst="rect">
             <a:avLst/>
@@ -12217,7 +12259,7 @@
           <a:p>
             <a:r>
               <a:rPr lang="en-AU" dirty="0"/>
-              <a:t>Renamed the columns to be more meaningful</a:t>
+              <a:t>Renamed the columns to be more meaningful remove NA values</a:t>
             </a:r>
           </a:p>
           <a:p>
@@ -12382,10 +12424,10 @@
       </p:pic>
       <p:pic>
         <p:nvPicPr>
-          <p:cNvPr id="12" name="Picture 11">
-            <a:extLst>
-              <a:ext uri="{FF2B5EF4-FFF2-40B4-BE49-F238E27FC236}">
-                <a16:creationId xmlns:a16="http://schemas.microsoft.com/office/drawing/2014/main" id="{FEEBCD1B-EA83-43FB-B6B5-9AB587D5D625}"/>
+          <p:cNvPr id="14" name="Picture 13">
+            <a:extLst>
+              <a:ext uri="{FF2B5EF4-FFF2-40B4-BE49-F238E27FC236}">
+                <a16:creationId xmlns:a16="http://schemas.microsoft.com/office/drawing/2014/main" id="{7D686CB3-3AB8-465A-BC9E-D5A37E3A6E6C}"/>
               </a:ext>
             </a:extLst>
           </p:cNvPr>
@@ -12402,8 +12444,8 @@
         </p:blipFill>
         <p:spPr>
           <a:xfrm>
-            <a:off x="5007311" y="1622850"/>
-            <a:ext cx="3704192" cy="1018303"/>
+            <a:off x="8817886" y="1496654"/>
+            <a:ext cx="3051996" cy="2288997"/>
           </a:xfrm>
           <a:prstGeom prst="rect">
             <a:avLst/>
@@ -12412,10 +12454,10 @@
       </p:pic>
       <p:pic>
         <p:nvPicPr>
-          <p:cNvPr id="14" name="Picture 13">
-            <a:extLst>
-              <a:ext uri="{FF2B5EF4-FFF2-40B4-BE49-F238E27FC236}">
-                <a16:creationId xmlns:a16="http://schemas.microsoft.com/office/drawing/2014/main" id="{7D686CB3-3AB8-465A-BC9E-D5A37E3A6E6C}"/>
+          <p:cNvPr id="9" name="Picture 8">
+            <a:extLst>
+              <a:ext uri="{FF2B5EF4-FFF2-40B4-BE49-F238E27FC236}">
+                <a16:creationId xmlns:a16="http://schemas.microsoft.com/office/drawing/2014/main" id="{707E9EBA-ED29-494F-83E9-A949FB48A841}"/>
               </a:ext>
             </a:extLst>
           </p:cNvPr>
@@ -12432,8 +12474,8 @@
         </p:blipFill>
         <p:spPr>
           <a:xfrm>
-            <a:off x="8817886" y="1496654"/>
-            <a:ext cx="3051996" cy="2288997"/>
+            <a:off x="5007311" y="1567886"/>
+            <a:ext cx="3704192" cy="1073266"/>
           </a:xfrm>
           <a:prstGeom prst="rect">
             <a:avLst/>
@@ -12690,8 +12732,8 @@
         </p:nvSpPr>
         <p:spPr>
           <a:xfrm>
-            <a:off x="5031966" y="1451218"/>
-            <a:ext cx="7487448" cy="4658216"/>
+            <a:off x="4660053" y="1435947"/>
+            <a:ext cx="7859361" cy="4673487"/>
           </a:xfrm>
         </p:spPr>
         <p:txBody>
@@ -12699,9 +12741,16 @@
           <a:lstStyle/>
           <a:p>
             <a:r>
-              <a:rPr lang="en-AU" dirty="0"/>
-              <a:t>Renamed the columns to be more meaningful</a:t>
-            </a:r>
+              <a:rPr lang="en-AU" sz="1800" dirty="0"/>
+              <a:t>Renamed the columns to be more meaningful and dropped NA values</a:t>
+            </a:r>
+          </a:p>
+          <a:p>
+            <a:endParaRPr lang="en-AU" sz="1800" dirty="0">
+              <a:highlight>
+                <a:srgbClr val="FFFF00"/>
+              </a:highlight>
+            </a:endParaRPr>
           </a:p>
           <a:p>
             <a:endParaRPr lang="en-AU" dirty="0">
@@ -12732,15 +12781,8 @@
             </a:endParaRPr>
           </a:p>
           <a:p>
-            <a:endParaRPr lang="en-AU" dirty="0">
-              <a:highlight>
-                <a:srgbClr val="FFFF00"/>
-              </a:highlight>
-            </a:endParaRPr>
-          </a:p>
-          <a:p>
-            <a:r>
-              <a:rPr lang="en-AU" dirty="0"/>
+            <a:r>
+              <a:rPr lang="en-AU" sz="1800" dirty="0"/>
               <a:t>Filtered to the date range required </a:t>
             </a:r>
           </a:p>
@@ -12791,10 +12833,10 @@
       </p:sp>
       <p:pic>
         <p:nvPicPr>
-          <p:cNvPr id="6" name="Picture 5">
-            <a:extLst>
-              <a:ext uri="{FF2B5EF4-FFF2-40B4-BE49-F238E27FC236}">
-                <a16:creationId xmlns:a16="http://schemas.microsoft.com/office/drawing/2014/main" id="{513CC23F-72E8-41C7-B111-246FA44CF654}"/>
+          <p:cNvPr id="8" name="Picture 7">
+            <a:extLst>
+              <a:ext uri="{FF2B5EF4-FFF2-40B4-BE49-F238E27FC236}">
+                <a16:creationId xmlns:a16="http://schemas.microsoft.com/office/drawing/2014/main" id="{BF9B1A9D-FB9B-4F8D-AC80-742521AF76A8}"/>
               </a:ext>
             </a:extLst>
           </p:cNvPr>
@@ -12811,8 +12853,8 @@
         </p:blipFill>
         <p:spPr>
           <a:xfrm>
-            <a:off x="5031964" y="1478918"/>
-            <a:ext cx="3804573" cy="1046490"/>
+            <a:off x="5031965" y="2497708"/>
+            <a:ext cx="6519954" cy="1308497"/>
           </a:xfrm>
           <a:prstGeom prst="rect">
             <a:avLst/>
@@ -12821,10 +12863,10 @@
       </p:pic>
       <p:pic>
         <p:nvPicPr>
-          <p:cNvPr id="8" name="Picture 7">
-            <a:extLst>
-              <a:ext uri="{FF2B5EF4-FFF2-40B4-BE49-F238E27FC236}">
-                <a16:creationId xmlns:a16="http://schemas.microsoft.com/office/drawing/2014/main" id="{BF9B1A9D-FB9B-4F8D-AC80-742521AF76A8}"/>
+          <p:cNvPr id="10" name="Picture 9">
+            <a:extLst>
+              <a:ext uri="{FF2B5EF4-FFF2-40B4-BE49-F238E27FC236}">
+                <a16:creationId xmlns:a16="http://schemas.microsoft.com/office/drawing/2014/main" id="{CECEAF72-BEB4-4307-ACA5-BEE5CC0B1BEC}"/>
               </a:ext>
             </a:extLst>
           </p:cNvPr>
@@ -12841,8 +12883,8 @@
         </p:blipFill>
         <p:spPr>
           <a:xfrm>
-            <a:off x="5031965" y="2497708"/>
-            <a:ext cx="6519954" cy="1308497"/>
+            <a:off x="5060492" y="4148414"/>
+            <a:ext cx="3955898" cy="370492"/>
           </a:xfrm>
           <a:prstGeom prst="rect">
             <a:avLst/>
@@ -12851,10 +12893,10 @@
       </p:pic>
       <p:pic>
         <p:nvPicPr>
-          <p:cNvPr id="10" name="Picture 9">
-            <a:extLst>
-              <a:ext uri="{FF2B5EF4-FFF2-40B4-BE49-F238E27FC236}">
-                <a16:creationId xmlns:a16="http://schemas.microsoft.com/office/drawing/2014/main" id="{CECEAF72-BEB4-4307-ACA5-BEE5CC0B1BEC}"/>
+          <p:cNvPr id="12" name="Picture 11">
+            <a:extLst>
+              <a:ext uri="{FF2B5EF4-FFF2-40B4-BE49-F238E27FC236}">
+                <a16:creationId xmlns:a16="http://schemas.microsoft.com/office/drawing/2014/main" id="{D97DCA61-FBE5-4AF5-AD9C-D70764CCB863}"/>
               </a:ext>
             </a:extLst>
           </p:cNvPr>
@@ -12871,8 +12913,8 @@
         </p:blipFill>
         <p:spPr>
           <a:xfrm>
-            <a:off x="5060492" y="4148414"/>
-            <a:ext cx="3955898" cy="370492"/>
+            <a:off x="5060493" y="4629121"/>
+            <a:ext cx="3955898" cy="443205"/>
           </a:xfrm>
           <a:prstGeom prst="rect">
             <a:avLst/>
@@ -12881,10 +12923,10 @@
       </p:pic>
       <p:pic>
         <p:nvPicPr>
-          <p:cNvPr id="12" name="Picture 11">
-            <a:extLst>
-              <a:ext uri="{FF2B5EF4-FFF2-40B4-BE49-F238E27FC236}">
-                <a16:creationId xmlns:a16="http://schemas.microsoft.com/office/drawing/2014/main" id="{D97DCA61-FBE5-4AF5-AD9C-D70764CCB863}"/>
+          <p:cNvPr id="14" name="Picture 13">
+            <a:extLst>
+              <a:ext uri="{FF2B5EF4-FFF2-40B4-BE49-F238E27FC236}">
+                <a16:creationId xmlns:a16="http://schemas.microsoft.com/office/drawing/2014/main" id="{9DEEE59B-03FD-4D03-BCE4-2AF02465AB40}"/>
               </a:ext>
             </a:extLst>
           </p:cNvPr>
@@ -12901,8 +12943,8 @@
         </p:blipFill>
         <p:spPr>
           <a:xfrm>
-            <a:off x="5060493" y="4629121"/>
-            <a:ext cx="3955898" cy="443205"/>
+            <a:off x="5138337" y="5102804"/>
+            <a:ext cx="4777203" cy="818317"/>
           </a:xfrm>
           <a:prstGeom prst="rect">
             <a:avLst/>
@@ -12911,10 +12953,10 @@
       </p:pic>
       <p:pic>
         <p:nvPicPr>
-          <p:cNvPr id="14" name="Picture 13">
-            <a:extLst>
-              <a:ext uri="{FF2B5EF4-FFF2-40B4-BE49-F238E27FC236}">
-                <a16:creationId xmlns:a16="http://schemas.microsoft.com/office/drawing/2014/main" id="{9DEEE59B-03FD-4D03-BCE4-2AF02465AB40}"/>
+          <p:cNvPr id="7" name="Picture 6">
+            <a:extLst>
+              <a:ext uri="{FF2B5EF4-FFF2-40B4-BE49-F238E27FC236}">
+                <a16:creationId xmlns:a16="http://schemas.microsoft.com/office/drawing/2014/main" id="{02DD8D61-E4FC-4CAA-80FA-EA0E114E215A}"/>
               </a:ext>
             </a:extLst>
           </p:cNvPr>
@@ -12931,8 +12973,8 @@
         </p:blipFill>
         <p:spPr>
           <a:xfrm>
-            <a:off x="5138337" y="5102804"/>
-            <a:ext cx="4777203" cy="818317"/>
+            <a:off x="5138337" y="1553560"/>
+            <a:ext cx="4611828" cy="913670"/>
           </a:xfrm>
           <a:prstGeom prst="rect">
             <a:avLst/>

</xml_diff>

<commit_message>
pvalue added to presentation
</commit_message>
<xml_diff>
--- a/Project1.pptx
+++ b/Project1.pptx
@@ -10823,6 +10823,14 @@
 <file path=ppt/slides/slide18.xml><?xml version="1.0" encoding="utf-8"?>
 <p:sld xmlns:a="http://schemas.openxmlformats.org/drawingml/2006/main" xmlns:r="http://schemas.openxmlformats.org/officeDocument/2006/relationships" xmlns:p="http://schemas.openxmlformats.org/presentationml/2006/main">
   <p:cSld>
+    <p:bg>
+      <p:bgPr>
+        <a:solidFill>
+          <a:schemeClr val="bg1"/>
+        </a:solidFill>
+        <a:effectLst/>
+      </p:bgPr>
+    </p:bg>
     <p:spTree>
       <p:nvGrpSpPr>
         <p:cNvPr id="1" name=""/>
@@ -10839,6 +10847,101 @@
       </p:grpSpPr>
       <p:sp>
         <p:nvSpPr>
+          <p:cNvPr id="11" name="Down Arrow 7">
+            <a:extLst>
+              <a:ext uri="{FF2B5EF4-FFF2-40B4-BE49-F238E27FC236}">
+                <a16:creationId xmlns:a16="http://schemas.microsoft.com/office/drawing/2014/main" id="{73DE2CFE-42F2-48F0-8706-5264E012B10C}"/>
+              </a:ext>
+              <a:ext uri="{C183D7F6-B498-43B3-948B-1728B52AA6E4}">
+                <adec:decorative xmlns:adec="http://schemas.microsoft.com/office/drawing/2017/decorative" val="1"/>
+              </a:ext>
+            </a:extLst>
+          </p:cNvPr>
+          <p:cNvSpPr>
+            <a:spLocks noGrp="1" noRot="1" noChangeAspect="1" noMove="1" noResize="1" noEditPoints="1" noAdjustHandles="1" noChangeArrowheads="1" noChangeShapeType="1" noTextEdit="1"/>
+          </p:cNvSpPr>
+          <p:nvPr>
+            <p:extLst>
+              <p:ext uri="{386F3935-93C4-4BCD-93E2-E3B085C9AB24}">
+                <p16:designElem xmlns:p16="http://schemas.microsoft.com/office/powerpoint/2015/main" val="1"/>
+              </p:ext>
+            </p:extLst>
+          </p:nvPr>
+        </p:nvSpPr>
+        <p:spPr>
+          <a:xfrm rot="16200000">
+            <a:off x="1288521" y="381403"/>
+            <a:ext cx="2200313" cy="3342508"/>
+          </a:xfrm>
+          <a:prstGeom prst="downArrow">
+            <a:avLst>
+              <a:gd name="adj1" fmla="val 100000"/>
+              <a:gd name="adj2" fmla="val 15788"/>
+            </a:avLst>
+          </a:prstGeom>
+          <a:solidFill>
+            <a:srgbClr val="404040"/>
+          </a:solidFill>
+          <a:ln w="53975">
+            <a:noFill/>
+          </a:ln>
+        </p:spPr>
+        <p:style>
+          <a:lnRef idx="2">
+            <a:schemeClr val="accent1">
+              <a:shade val="50000"/>
+            </a:schemeClr>
+          </a:lnRef>
+          <a:fillRef idx="1">
+            <a:schemeClr val="accent1"/>
+          </a:fillRef>
+          <a:effectRef idx="0">
+            <a:schemeClr val="accent1"/>
+          </a:effectRef>
+          <a:fontRef idx="minor">
+            <a:schemeClr val="lt1"/>
+          </a:fontRef>
+        </p:style>
+        <p:txBody>
+          <a:bodyPr rtlCol="0" anchor="ctr"/>
+          <a:lstStyle/>
+          <a:p>
+            <a:pPr marL="0" marR="0" lvl="0" indent="0" algn="ctr" defTabSz="914400" rtl="0" eaLnBrk="1" fontAlgn="auto" latinLnBrk="0" hangingPunct="1">
+              <a:lnSpc>
+                <a:spcPct val="100000"/>
+              </a:lnSpc>
+              <a:spcBef>
+                <a:spcPts val="0"/>
+              </a:spcBef>
+              <a:spcAft>
+                <a:spcPts val="0"/>
+              </a:spcAft>
+              <a:buClrTx/>
+              <a:buSzTx/>
+              <a:buFontTx/>
+              <a:buNone/>
+              <a:tabLst/>
+              <a:defRPr/>
+            </a:pPr>
+            <a:endParaRPr kumimoji="0" lang="en-US" sz="1800" b="0" i="0" u="none" strike="noStrike" kern="1200" cap="none" spc="0" normalizeH="0" baseline="0" noProof="0">
+              <a:ln>
+                <a:noFill/>
+              </a:ln>
+              <a:solidFill>
+                <a:prstClr val="white"/>
+              </a:solidFill>
+              <a:effectLst/>
+              <a:uLnTx/>
+              <a:uFillTx/>
+              <a:latin typeface="Calibri" panose="020F0502020204030204"/>
+              <a:ea typeface="+mn-ea"/>
+              <a:cs typeface="+mn-cs"/>
+            </a:endParaRPr>
+          </a:p>
+        </p:txBody>
+      </p:sp>
+      <p:sp>
+        <p:nvSpPr>
           <p:cNvPr id="2" name="Title 1">
             <a:extLst>
               <a:ext uri="{FF2B5EF4-FFF2-40B4-BE49-F238E27FC236}">
@@ -10855,52 +10958,109 @@
         </p:nvSpPr>
         <p:spPr>
           <a:xfrm>
-            <a:off x="838199" y="510398"/>
-            <a:ext cx="10515600" cy="1111983"/>
-          </a:xfrm>
-        </p:spPr>
-        <p:txBody>
-          <a:bodyPr>
+            <a:off x="966952" y="1204108"/>
+            <a:ext cx="2669406" cy="1781175"/>
+          </a:xfrm>
+        </p:spPr>
+        <p:txBody>
+          <a:bodyPr vert="horz" lIns="91440" tIns="45720" rIns="91440" bIns="45720" rtlCol="0" anchor="ctr">
             <a:normAutofit/>
           </a:bodyPr>
           <a:lstStyle/>
           <a:p>
-            <a:pPr algn="ctr"/>
-            <a:r>
-              <a:rPr lang="en-AU" sz="3200" b="1" dirty="0">
-                <a:latin typeface="Gill Sans MT" panose="020B0502020104020203" pitchFamily="34" charset="77"/>
+            <a:r>
+              <a:rPr lang="en-US" sz="2200" b="1" kern="1200">
+                <a:solidFill>
+                  <a:srgbClr val="FFFFFF"/>
+                </a:solidFill>
+                <a:latin typeface="+mj-lt"/>
+                <a:ea typeface="+mj-ea"/>
+                <a:cs typeface="+mj-cs"/>
               </a:rPr>
               <a:t>Correlation between Unemployment and </a:t>
             </a:r>
             <a:br>
-              <a:rPr lang="en-AU" sz="3200" b="1" dirty="0">
-                <a:latin typeface="Gill Sans MT" panose="020B0502020104020203" pitchFamily="34" charset="77"/>
+              <a:rPr lang="en-US" sz="2200" b="1" kern="1200">
+                <a:solidFill>
+                  <a:srgbClr val="FFFFFF"/>
+                </a:solidFill>
+                <a:latin typeface="+mj-lt"/>
+                <a:ea typeface="+mj-ea"/>
+                <a:cs typeface="+mj-cs"/>
               </a:rPr>
             </a:br>
             <a:r>
-              <a:rPr lang="en-AU" sz="3200" b="1" dirty="0">
-                <a:latin typeface="Gill Sans MT" panose="020B0502020104020203" pitchFamily="34" charset="77"/>
+              <a:rPr lang="en-US" sz="2200" b="1" kern="1200">
+                <a:solidFill>
+                  <a:srgbClr val="FFFFFF"/>
+                </a:solidFill>
+                <a:latin typeface="+mj-lt"/>
+                <a:ea typeface="+mj-ea"/>
+                <a:cs typeface="+mj-cs"/>
               </a:rPr>
               <a:t>COVID cases in Australia in 2020</a:t>
             </a:r>
           </a:p>
         </p:txBody>
       </p:sp>
+      <p:sp>
+        <p:nvSpPr>
+          <p:cNvPr id="6" name="Content Placeholder 5">
+            <a:extLst>
+              <a:ext uri="{FF2B5EF4-FFF2-40B4-BE49-F238E27FC236}">
+                <a16:creationId xmlns:a16="http://schemas.microsoft.com/office/drawing/2014/main" id="{A3034C4D-FCBF-4128-8148-694158055DBC}"/>
+              </a:ext>
+            </a:extLst>
+          </p:cNvPr>
+          <p:cNvSpPr>
+            <a:spLocks noGrp="1"/>
+          </p:cNvSpPr>
+          <p:nvPr>
+            <p:ph sz="half" idx="2"/>
+          </p:nvPr>
+        </p:nvSpPr>
+        <p:spPr>
+          <a:xfrm>
+            <a:off x="966951" y="3355130"/>
+            <a:ext cx="2669407" cy="2427333"/>
+          </a:xfrm>
+        </p:spPr>
+        <p:txBody>
+          <a:bodyPr vert="horz" lIns="91440" tIns="45720" rIns="91440" bIns="45720" rtlCol="0">
+            <a:normAutofit/>
+          </a:bodyPr>
+          <a:lstStyle/>
+          <a:p>
+            <a:r>
+              <a:rPr lang="en-US" sz="1600" dirty="0"/>
+              <a:t>p-value is greater than 0.05</a:t>
+            </a:r>
+          </a:p>
+          <a:p>
+            <a:r>
+              <a:rPr lang="en-US" sz="1600"/>
+              <a:t>As result can’t reject Null hypothesis</a:t>
+            </a:r>
+          </a:p>
+          <a:p>
+            <a:pPr marL="0"/>
+            <a:endParaRPr lang="en-US" sz="1600" dirty="0"/>
+          </a:p>
+        </p:txBody>
+      </p:sp>
       <p:pic>
         <p:nvPicPr>
-          <p:cNvPr id="7" name="Content Placeholder 7">
-            <a:extLst>
-              <a:ext uri="{FF2B5EF4-FFF2-40B4-BE49-F238E27FC236}">
-                <a16:creationId xmlns:a16="http://schemas.microsoft.com/office/drawing/2014/main" id="{87BEBC25-BD52-4DE1-8F04-F339C1429ECA}"/>
+          <p:cNvPr id="4" name="Picture 3">
+            <a:extLst>
+              <a:ext uri="{FF2B5EF4-FFF2-40B4-BE49-F238E27FC236}">
+                <a16:creationId xmlns:a16="http://schemas.microsoft.com/office/drawing/2014/main" id="{B8B3CB02-07F9-495D-BBC6-163C01DE9092}"/>
               </a:ext>
             </a:extLst>
           </p:cNvPr>
           <p:cNvPicPr>
-            <a:picLocks noGrp="1" noChangeAspect="1"/>
+            <a:picLocks noChangeAspect="1"/>
           </p:cNvPicPr>
-          <p:nvPr>
-            <p:ph sz="half" idx="2"/>
-          </p:nvPr>
+          <p:nvPr/>
         </p:nvPicPr>
         <p:blipFill>
           <a:blip r:embed="rId3"/>
@@ -10910,8 +11070,8 @@
         </p:blipFill>
         <p:spPr>
           <a:xfrm>
-            <a:off x="3363715" y="1827064"/>
-            <a:ext cx="5464569" cy="3964546"/>
+            <a:off x="5242281" y="952500"/>
+            <a:ext cx="5743365" cy="4829963"/>
           </a:xfrm>
           <a:prstGeom prst="rect">
             <a:avLst/>
@@ -11167,6 +11327,14 @@
 <file path=ppt/slides/slide20.xml><?xml version="1.0" encoding="utf-8"?>
 <p:sld xmlns:a="http://schemas.openxmlformats.org/drawingml/2006/main" xmlns:r="http://schemas.openxmlformats.org/officeDocument/2006/relationships" xmlns:p="http://schemas.openxmlformats.org/presentationml/2006/main">
   <p:cSld>
+    <p:bg>
+      <p:bgPr>
+        <a:solidFill>
+          <a:schemeClr val="bg1"/>
+        </a:solidFill>
+        <a:effectLst/>
+      </p:bgPr>
+    </p:bg>
     <p:spTree>
       <p:nvGrpSpPr>
         <p:cNvPr id="1" name=""/>
@@ -11183,6 +11351,101 @@
       </p:grpSpPr>
       <p:sp>
         <p:nvSpPr>
+          <p:cNvPr id="11" name="Down Arrow 7">
+            <a:extLst>
+              <a:ext uri="{FF2B5EF4-FFF2-40B4-BE49-F238E27FC236}">
+                <a16:creationId xmlns:a16="http://schemas.microsoft.com/office/drawing/2014/main" id="{73DE2CFE-42F2-48F0-8706-5264E012B10C}"/>
+              </a:ext>
+              <a:ext uri="{C183D7F6-B498-43B3-948B-1728B52AA6E4}">
+                <adec:decorative xmlns:adec="http://schemas.microsoft.com/office/drawing/2017/decorative" val="1"/>
+              </a:ext>
+            </a:extLst>
+          </p:cNvPr>
+          <p:cNvSpPr>
+            <a:spLocks noGrp="1" noRot="1" noChangeAspect="1" noMove="1" noResize="1" noEditPoints="1" noAdjustHandles="1" noChangeArrowheads="1" noChangeShapeType="1" noTextEdit="1"/>
+          </p:cNvSpPr>
+          <p:nvPr>
+            <p:extLst>
+              <p:ext uri="{386F3935-93C4-4BCD-93E2-E3B085C9AB24}">
+                <p16:designElem xmlns:p16="http://schemas.microsoft.com/office/powerpoint/2015/main" val="1"/>
+              </p:ext>
+            </p:extLst>
+          </p:nvPr>
+        </p:nvSpPr>
+        <p:spPr>
+          <a:xfrm rot="16200000">
+            <a:off x="1288521" y="381403"/>
+            <a:ext cx="2200313" cy="3342508"/>
+          </a:xfrm>
+          <a:prstGeom prst="downArrow">
+            <a:avLst>
+              <a:gd name="adj1" fmla="val 100000"/>
+              <a:gd name="adj2" fmla="val 15788"/>
+            </a:avLst>
+          </a:prstGeom>
+          <a:solidFill>
+            <a:srgbClr val="404040"/>
+          </a:solidFill>
+          <a:ln w="53975">
+            <a:noFill/>
+          </a:ln>
+        </p:spPr>
+        <p:style>
+          <a:lnRef idx="2">
+            <a:schemeClr val="accent1">
+              <a:shade val="50000"/>
+            </a:schemeClr>
+          </a:lnRef>
+          <a:fillRef idx="1">
+            <a:schemeClr val="accent1"/>
+          </a:fillRef>
+          <a:effectRef idx="0">
+            <a:schemeClr val="accent1"/>
+          </a:effectRef>
+          <a:fontRef idx="minor">
+            <a:schemeClr val="lt1"/>
+          </a:fontRef>
+        </p:style>
+        <p:txBody>
+          <a:bodyPr rtlCol="0" anchor="ctr"/>
+          <a:lstStyle/>
+          <a:p>
+            <a:pPr marL="0" marR="0" lvl="0" indent="0" algn="ctr" defTabSz="914400" rtl="0" eaLnBrk="1" fontAlgn="auto" latinLnBrk="0" hangingPunct="1">
+              <a:lnSpc>
+                <a:spcPct val="100000"/>
+              </a:lnSpc>
+              <a:spcBef>
+                <a:spcPts val="0"/>
+              </a:spcBef>
+              <a:spcAft>
+                <a:spcPts val="0"/>
+              </a:spcAft>
+              <a:buClrTx/>
+              <a:buSzTx/>
+              <a:buFontTx/>
+              <a:buNone/>
+              <a:tabLst/>
+              <a:defRPr/>
+            </a:pPr>
+            <a:endParaRPr kumimoji="0" lang="en-US" sz="1800" b="0" i="0" u="none" strike="noStrike" kern="1200" cap="none" spc="0" normalizeH="0" baseline="0" noProof="0">
+              <a:ln>
+                <a:noFill/>
+              </a:ln>
+              <a:solidFill>
+                <a:prstClr val="white"/>
+              </a:solidFill>
+              <a:effectLst/>
+              <a:uLnTx/>
+              <a:uFillTx/>
+              <a:latin typeface="Calibri" panose="020F0502020204030204"/>
+              <a:ea typeface="+mn-ea"/>
+              <a:cs typeface="+mn-cs"/>
+            </a:endParaRPr>
+          </a:p>
+        </p:txBody>
+      </p:sp>
+      <p:sp>
+        <p:nvSpPr>
           <p:cNvPr id="2" name="Title 1">
             <a:extLst>
               <a:ext uri="{FF2B5EF4-FFF2-40B4-BE49-F238E27FC236}">
@@ -11197,50 +11460,130 @@
             <p:ph type="title"/>
           </p:nvPr>
         </p:nvSpPr>
-        <p:spPr/>
-        <p:txBody>
-          <a:bodyPr>
+        <p:spPr>
+          <a:xfrm>
+            <a:off x="966952" y="1204108"/>
+            <a:ext cx="2669406" cy="1781175"/>
+          </a:xfrm>
+        </p:spPr>
+        <p:txBody>
+          <a:bodyPr vert="horz" lIns="91440" tIns="45720" rIns="91440" bIns="45720" rtlCol="0" anchor="ctr">
             <a:normAutofit/>
           </a:bodyPr>
           <a:lstStyle/>
           <a:p>
-            <a:pPr algn="ctr"/>
-            <a:r>
-              <a:rPr lang="en-US" sz="3200" b="1" i="0" u="none" strike="noStrike" dirty="0">
+            <a:r>
+              <a:rPr lang="en-US" sz="2700" b="1" i="0" u="none" strike="noStrike" kern="1200">
+                <a:solidFill>
+                  <a:srgbClr val="FFFFFF"/>
+                </a:solidFill>
                 <a:effectLst/>
-                <a:latin typeface="Gill Sans MT" panose="020B0502020104020203" pitchFamily="34" charset="77"/>
-                <a:cs typeface="Calibri" panose="020F0502020204030204" pitchFamily="34" charset="0"/>
+                <a:latin typeface="+mj-lt"/>
+                <a:ea typeface="+mj-ea"/>
+                <a:cs typeface="+mj-cs"/>
               </a:rPr>
               <a:t>Job vacancies and COVID-19 case </a:t>
             </a:r>
             <a:br>
-              <a:rPr lang="en-US" sz="3200" b="1" i="0" u="none" strike="noStrike" dirty="0">
+              <a:rPr lang="en-US" sz="2700" b="1" i="0" u="none" strike="noStrike" kern="1200">
+                <a:solidFill>
+                  <a:srgbClr val="FFFFFF"/>
+                </a:solidFill>
                 <a:effectLst/>
-                <a:latin typeface="Gill Sans MT" panose="020B0502020104020203" pitchFamily="34" charset="77"/>
-                <a:cs typeface="Calibri" panose="020F0502020204030204" pitchFamily="34" charset="0"/>
+                <a:latin typeface="+mj-lt"/>
+                <a:ea typeface="+mj-ea"/>
+                <a:cs typeface="+mj-cs"/>
               </a:rPr>
             </a:br>
             <a:r>
-              <a:rPr lang="en-US" sz="3200" b="1" i="0" u="none" strike="noStrike" dirty="0">
+              <a:rPr lang="en-US" sz="2700" b="1" i="0" u="none" strike="noStrike" kern="1200">
+                <a:solidFill>
+                  <a:srgbClr val="FFFFFF"/>
+                </a:solidFill>
                 <a:effectLst/>
-                <a:latin typeface="Gill Sans MT" panose="020B0502020104020203" pitchFamily="34" charset="77"/>
-                <a:cs typeface="Calibri" panose="020F0502020204030204" pitchFamily="34" charset="0"/>
+                <a:latin typeface="+mj-lt"/>
+                <a:ea typeface="+mj-ea"/>
+                <a:cs typeface="+mj-cs"/>
               </a:rPr>
               <a:t>correlation in Australia</a:t>
             </a:r>
-            <a:endParaRPr lang="en-US" sz="3200" dirty="0">
-              <a:latin typeface="Gill Sans MT" panose="020B0502020104020203" pitchFamily="34" charset="77"/>
-              <a:cs typeface="Calibri" panose="020F0502020204030204" pitchFamily="34" charset="0"/>
+            <a:endParaRPr lang="en-US" sz="2700" kern="1200">
+              <a:solidFill>
+                <a:srgbClr val="FFFFFF"/>
+              </a:solidFill>
+              <a:latin typeface="+mj-lt"/>
+              <a:ea typeface="+mj-ea"/>
+              <a:cs typeface="+mj-cs"/>
             </a:endParaRPr>
+          </a:p>
+        </p:txBody>
+      </p:sp>
+      <p:sp>
+        <p:nvSpPr>
+          <p:cNvPr id="5" name="TextBox 4">
+            <a:extLst>
+              <a:ext uri="{FF2B5EF4-FFF2-40B4-BE49-F238E27FC236}">
+                <a16:creationId xmlns:a16="http://schemas.microsoft.com/office/drawing/2014/main" id="{3472E7FF-7A78-458B-8A90-B3B9D63CCFB4}"/>
+              </a:ext>
+            </a:extLst>
+          </p:cNvPr>
+          <p:cNvSpPr txBox="1"/>
+          <p:nvPr/>
+        </p:nvSpPr>
+        <p:spPr>
+          <a:xfrm>
+            <a:off x="966951" y="3355130"/>
+            <a:ext cx="2669407" cy="2427333"/>
+          </a:xfrm>
+          <a:prstGeom prst="rect">
+            <a:avLst/>
+          </a:prstGeom>
+        </p:spPr>
+        <p:txBody>
+          <a:bodyPr vert="horz" lIns="91440" tIns="45720" rIns="91440" bIns="45720" rtlCol="0">
+            <a:normAutofit/>
+          </a:bodyPr>
+          <a:lstStyle/>
+          <a:p>
+            <a:pPr marL="285750" indent="-228600">
+              <a:lnSpc>
+                <a:spcPct val="90000"/>
+              </a:lnSpc>
+              <a:spcAft>
+                <a:spcPts val="600"/>
+              </a:spcAft>
+              <a:buFont typeface="Arial" panose="020B0604020202020204" pitchFamily="34" charset="0"/>
+              <a:buChar char="•"/>
+            </a:pPr>
+            <a:r>
+              <a:rPr lang="en-US" sz="1600"/>
+              <a:t>p-value is greater than 0.05</a:t>
+            </a:r>
+          </a:p>
+          <a:p>
+            <a:pPr marL="285750" indent="-228600">
+              <a:lnSpc>
+                <a:spcPct val="90000"/>
+              </a:lnSpc>
+              <a:spcAft>
+                <a:spcPts val="600"/>
+              </a:spcAft>
+              <a:buFont typeface="Arial" panose="020B0604020202020204" pitchFamily="34" charset="0"/>
+              <a:buChar char="•"/>
+            </a:pPr>
+            <a:r>
+              <a:rPr lang="en-US" sz="1600"/>
+              <a:t>As result can’t reject Null hypothesis</a:t>
+            </a:r>
           </a:p>
         </p:txBody>
       </p:sp>
       <p:pic>
         <p:nvPicPr>
-          <p:cNvPr id="8" name="Content Placeholder 3">
-            <a:extLst>
-              <a:ext uri="{FF2B5EF4-FFF2-40B4-BE49-F238E27FC236}">
-                <a16:creationId xmlns:a16="http://schemas.microsoft.com/office/drawing/2014/main" id="{985EBDED-098E-4FBF-A25D-D5C32E83F4AD}"/>
+          <p:cNvPr id="6" name="Picture 5">
+            <a:extLst>
+              <a:ext uri="{FF2B5EF4-FFF2-40B4-BE49-F238E27FC236}">
+                <a16:creationId xmlns:a16="http://schemas.microsoft.com/office/drawing/2014/main" id="{5CB557ED-35B5-425B-A361-D402F73F4592}"/>
               </a:ext>
             </a:extLst>
           </p:cNvPr>
@@ -11257,8 +11600,8 @@
         </p:blipFill>
         <p:spPr>
           <a:xfrm>
-            <a:off x="3422908" y="1690688"/>
-            <a:ext cx="5081910" cy="4164486"/>
+            <a:off x="5362806" y="952500"/>
+            <a:ext cx="5502315" cy="4829963"/>
           </a:xfrm>
           <a:prstGeom prst="rect">
             <a:avLst/>

</xml_diff>